<commit_message>
update risk matrix chart and add aws risk
</commit_message>
<xml_diff>
--- a/Documentation/src/03_project-documentation/Risk Matrix - extract chart as png.pptx
+++ b/Documentation/src/03_project-documentation/Risk Matrix - extract chart as png.pptx
@@ -5,7 +5,7 @@
     <p:sldMasterId id="2147483648" r:id="rId1"/>
   </p:sldMasterIdLst>
   <p:sldIdLst>
-    <p:sldId id="256" r:id="rId2"/>
+    <p:sldId id="257" r:id="rId2"/>
   </p:sldIdLst>
   <p:sldSz cx="12192000" cy="6858000"/>
   <p:notesSz cx="6858000" cy="9144000"/>
@@ -162,57 +162,9 @@
       <c:style val="2"/>
     </mc:Fallback>
   </mc:AlternateContent>
+  <c:clrMapOvr bg1="lt1" tx1="dk1" bg2="lt2" tx2="dk2" accent1="accent1" accent2="accent2" accent3="accent3" accent4="accent4" accent5="accent5" accent6="accent6" hlink="hlink" folHlink="folHlink"/>
   <c:chart>
-    <c:title>
-      <c:tx>
-        <c:rich>
-          <a:bodyPr rot="0" spcFirstLastPara="1" vertOverflow="ellipsis" vert="horz" wrap="square" anchor="ctr" anchorCtr="1"/>
-          <a:lstStyle/>
-          <a:p>
-            <a:pPr>
-              <a:defRPr sz="1400" b="1" i="0" u="none" strike="noStrike" kern="1200" spc="0" baseline="0">
-                <a:solidFill>
-                  <a:schemeClr val="tx1"/>
-                </a:solidFill>
-                <a:latin typeface="Arial" panose="020B0604020202020204" pitchFamily="34" charset="0"/>
-                <a:ea typeface="+mn-ea"/>
-                <a:cs typeface="Arial" panose="020B0604020202020204" pitchFamily="34" charset="0"/>
-              </a:defRPr>
-            </a:pPr>
-            <a:r>
-              <a:rPr lang="en-US" b="1"/>
-              <a:t>Risk Matrix for KubeWatch</a:t>
-            </a:r>
-          </a:p>
-        </c:rich>
-      </c:tx>
-      <c:overlay val="0"/>
-      <c:spPr>
-        <a:noFill/>
-        <a:ln>
-          <a:noFill/>
-        </a:ln>
-        <a:effectLst/>
-      </c:spPr>
-      <c:txPr>
-        <a:bodyPr rot="0" spcFirstLastPara="1" vertOverflow="ellipsis" vert="horz" wrap="square" anchor="ctr" anchorCtr="1"/>
-        <a:lstStyle/>
-        <a:p>
-          <a:pPr>
-            <a:defRPr sz="1400" b="1" i="0" u="none" strike="noStrike" kern="1200" spc="0" baseline="0">
-              <a:solidFill>
-                <a:schemeClr val="tx1"/>
-              </a:solidFill>
-              <a:latin typeface="Arial" panose="020B0604020202020204" pitchFamily="34" charset="0"/>
-              <a:ea typeface="+mn-ea"/>
-              <a:cs typeface="Arial" panose="020B0604020202020204" pitchFamily="34" charset="0"/>
-            </a:defRPr>
-          </a:pPr>
-          <a:endParaRPr lang="en-CH"/>
-        </a:p>
-      </c:txPr>
-    </c:title>
-    <c:autoTitleDeleted val="0"/>
+    <c:autoTitleDeleted val="1"/>
     <c:plotArea>
       <c:layout/>
       <c:bubbleChart>
@@ -220,27 +172,14 @@
         <c:ser>
           <c:idx val="0"/>
           <c:order val="0"/>
-          <c:tx>
-            <c:strRef>
-              <c:f>Sheet1!$B$2</c:f>
-              <c:strCache>
-                <c:ptCount val="1"/>
-                <c:pt idx="0">
-                  <c:v>Risk Matrix</c:v>
-                </c:pt>
-              </c:strCache>
-            </c:strRef>
-          </c:tx>
           <c:spPr>
             <a:solidFill>
-              <a:schemeClr val="bg1">
-                <a:lumMod val="95000"/>
-              </a:schemeClr>
+              <a:sysClr val="window" lastClr="FFFFFF">
+                <a:alpha val="74000"/>
+              </a:sysClr>
             </a:solidFill>
-            <a:ln w="12700">
-              <a:solidFill>
-                <a:srgbClr val="0070C0"/>
-              </a:solidFill>
+            <a:ln>
+              <a:noFill/>
             </a:ln>
             <a:effectLst/>
           </c:spPr>
@@ -253,74 +192,8 @@
                   <a:bodyPr/>
                   <a:lstStyle/>
                   <a:p>
-                    <a:fld id="{91D057DB-2617-4AA6-A2B8-08FA12F7A0B5}" type="CELLRANGE">
+                    <a:fld id="{67E02409-36FC-4FBE-9089-C27FA49ECD23}" type="CELLRANGE">
                       <a:rPr lang="en-US"/>
-                      <a:pPr/>
-                      <a:t>[CELLRANGE]</a:t>
-                    </a:fld>
-                    <a:endParaRPr lang="en-CH"/>
-                  </a:p>
-                </c:rich>
-              </c:tx>
-              <c:dLblPos val="ctr"/>
-              <c:showLegendKey val="0"/>
-              <c:showVal val="0"/>
-              <c:showCatName val="0"/>
-              <c:showSerName val="0"/>
-              <c:showPercent val="0"/>
-              <c:showBubbleSize val="0"/>
-              <c:extLst>
-                <c:ext xmlns:c15="http://schemas.microsoft.com/office/drawing/2012/chart" uri="{CE6537A1-D6FC-4f65-9D91-7224C49458BB}">
-                  <c15:dlblFieldTable/>
-                  <c15:showDataLabelsRange val="1"/>
-                </c:ext>
-                <c:ext xmlns:c16="http://schemas.microsoft.com/office/drawing/2014/chart" uri="{C3380CC4-5D6E-409C-BE32-E72D297353CC}">
-                  <c16:uniqueId val="{00000000-56E2-4932-8EC3-ADD650911F4A}"/>
-                </c:ext>
-              </c:extLst>
-            </c:dLbl>
-            <c:dLbl>
-              <c:idx val="1"/>
-              <c:tx>
-                <c:rich>
-                  <a:bodyPr/>
-                  <a:lstStyle/>
-                  <a:p>
-                    <a:fld id="{E2F086E1-BA5C-465E-8F9F-06157EABBE9D}" type="CELLRANGE">
-                      <a:rPr lang="en-US"/>
-                      <a:pPr/>
-                      <a:t>[CELLRANGE]</a:t>
-                    </a:fld>
-                    <a:endParaRPr lang="en-CH"/>
-                  </a:p>
-                </c:rich>
-              </c:tx>
-              <c:dLblPos val="ctr"/>
-              <c:showLegendKey val="0"/>
-              <c:showVal val="0"/>
-              <c:showCatName val="0"/>
-              <c:showSerName val="0"/>
-              <c:showPercent val="0"/>
-              <c:showBubbleSize val="0"/>
-              <c:extLst>
-                <c:ext xmlns:c15="http://schemas.microsoft.com/office/drawing/2012/chart" uri="{CE6537A1-D6FC-4f65-9D91-7224C49458BB}">
-                  <c15:dlblFieldTable/>
-                  <c15:showDataLabelsRange val="1"/>
-                </c:ext>
-                <c:ext xmlns:c16="http://schemas.microsoft.com/office/drawing/2014/chart" uri="{C3380CC4-5D6E-409C-BE32-E72D297353CC}">
-                  <c16:uniqueId val="{00000001-56E2-4932-8EC3-ADD650911F4A}"/>
-                </c:ext>
-              </c:extLst>
-            </c:dLbl>
-            <c:dLbl>
-              <c:idx val="2"/>
-              <c:tx>
-                <c:rich>
-                  <a:bodyPr/>
-                  <a:lstStyle/>
-                  <a:p>
-                    <a:fld id="{DA90EC99-FA20-4C99-97B2-0B1FDD59E9E6}" type="CELLRANGE">
-                      <a:rPr lang="en-CH"/>
                       <a:pPr/>
                       <a:t>[CELLRANGE]</a:t>
                     </a:fld>
@@ -342,19 +215,19 @@
                   <c15:showDataLabelsRange val="1"/>
                 </c:ext>
                 <c:ext xmlns:c16="http://schemas.microsoft.com/office/drawing/2014/chart" uri="{C3380CC4-5D6E-409C-BE32-E72D297353CC}">
-                  <c16:uniqueId val="{00000002-56E2-4932-8EC3-ADD650911F4A}"/>
+                  <c16:uniqueId val="{00000008-1938-485B-B875-578B183FAEA8}"/>
                 </c:ext>
               </c:extLst>
             </c:dLbl>
             <c:dLbl>
-              <c:idx val="3"/>
+              <c:idx val="1"/>
               <c:tx>
                 <c:rich>
                   <a:bodyPr/>
                   <a:lstStyle/>
                   <a:p>
-                    <a:fld id="{B84EADB8-94D8-4057-BDAF-B152214B7975}" type="CELLRANGE">
-                      <a:rPr lang="en-CH"/>
+                    <a:fld id="{D8A544FB-EB7A-4AD9-B718-EEFCBB6AC0A0}" type="CELLRANGE">
+                      <a:rPr lang="en-US"/>
                       <a:pPr/>
                       <a:t>[CELLRANGE]</a:t>
                     </a:fld>
@@ -376,19 +249,58 @@
                   <c15:showDataLabelsRange val="1"/>
                 </c:ext>
                 <c:ext xmlns:c16="http://schemas.microsoft.com/office/drawing/2014/chart" uri="{C3380CC4-5D6E-409C-BE32-E72D297353CC}">
-                  <c16:uniqueId val="{00000003-56E2-4932-8EC3-ADD650911F4A}"/>
+                  <c16:uniqueId val="{00000009-1938-485B-B875-578B183FAEA8}"/>
                 </c:ext>
               </c:extLst>
             </c:dLbl>
             <c:dLbl>
-              <c:idx val="4"/>
+              <c:idx val="2"/>
+              <c:layout>
+                <c:manualLayout>
+                  <c:x val="-9.8817534722222308E-2"/>
+                  <c:y val="4.409722222222202E-3"/>
+                </c:manualLayout>
+              </c:layout>
               <c:tx>
                 <c:rich>
                   <a:bodyPr/>
                   <a:lstStyle/>
                   <a:p>
-                    <a:fld id="{0F2D022B-D13A-4B95-A874-9F55604DB7D4}" type="CELLRANGE">
-                      <a:rPr lang="en-CH"/>
+                    <a:fld id="{6BCE16AF-05A6-421D-A45A-76171327FCDC}" type="CELLRANGE">
+                      <a:rPr lang="en-US"/>
+                      <a:pPr/>
+                      <a:t>[CELLRANGE]</a:t>
+                    </a:fld>
+                    <a:endParaRPr lang="en-CH"/>
+                  </a:p>
+                </c:rich>
+              </c:tx>
+              <c:dLblPos val="r"/>
+              <c:showLegendKey val="0"/>
+              <c:showVal val="0"/>
+              <c:showCatName val="0"/>
+              <c:showSerName val="0"/>
+              <c:showPercent val="0"/>
+              <c:showBubbleSize val="0"/>
+              <c:extLst>
+                <c:ext xmlns:c15="http://schemas.microsoft.com/office/drawing/2012/chart" uri="{CE6537A1-D6FC-4f65-9D91-7224C49458BB}">
+                  <c15:dlblFieldTable/>
+                  <c15:showDataLabelsRange val="1"/>
+                </c:ext>
+                <c:ext xmlns:c16="http://schemas.microsoft.com/office/drawing/2014/chart" uri="{C3380CC4-5D6E-409C-BE32-E72D297353CC}">
+                  <c16:uniqueId val="{0000000A-1938-485B-B875-578B183FAEA8}"/>
+                </c:ext>
+              </c:extLst>
+            </c:dLbl>
+            <c:dLbl>
+              <c:idx val="3"/>
+              <c:tx>
+                <c:rich>
+                  <a:bodyPr/>
+                  <a:lstStyle/>
+                  <a:p>
+                    <a:fld id="{97BD954F-116D-4F3F-B511-D9E19C646ED0}" type="CELLRANGE">
+                      <a:rPr lang="en-US"/>
                       <a:pPr/>
                       <a:t>[CELLRANGE]</a:t>
                     </a:fld>
@@ -410,19 +322,19 @@
                   <c15:showDataLabelsRange val="1"/>
                 </c:ext>
                 <c:ext xmlns:c16="http://schemas.microsoft.com/office/drawing/2014/chart" uri="{C3380CC4-5D6E-409C-BE32-E72D297353CC}">
-                  <c16:uniqueId val="{00000004-56E2-4932-8EC3-ADD650911F4A}"/>
+                  <c16:uniqueId val="{0000000B-1938-485B-B875-578B183FAEA8}"/>
                 </c:ext>
               </c:extLst>
             </c:dLbl>
             <c:dLbl>
-              <c:idx val="5"/>
+              <c:idx val="4"/>
               <c:tx>
                 <c:rich>
                   <a:bodyPr/>
                   <a:lstStyle/>
                   <a:p>
-                    <a:fld id="{446A9AE6-EA33-48EE-87FE-0D065E3263C2}" type="CELLRANGE">
-                      <a:rPr lang="en-CH"/>
+                    <a:fld id="{0409F740-916C-434B-936B-BE6B317D9AE8}" type="CELLRANGE">
+                      <a:rPr lang="en-US"/>
                       <a:pPr/>
                       <a:t>[CELLRANGE]</a:t>
                     </a:fld>
@@ -444,19 +356,19 @@
                   <c15:showDataLabelsRange val="1"/>
                 </c:ext>
                 <c:ext xmlns:c16="http://schemas.microsoft.com/office/drawing/2014/chart" uri="{C3380CC4-5D6E-409C-BE32-E72D297353CC}">
-                  <c16:uniqueId val="{00000005-56E2-4932-8EC3-ADD650911F4A}"/>
+                  <c16:uniqueId val="{0000000C-1938-485B-B875-578B183FAEA8}"/>
                 </c:ext>
               </c:extLst>
             </c:dLbl>
             <c:dLbl>
-              <c:idx val="6"/>
+              <c:idx val="5"/>
               <c:tx>
                 <c:rich>
                   <a:bodyPr/>
                   <a:lstStyle/>
                   <a:p>
-                    <a:fld id="{F07BA1A0-1D0F-471D-83D4-9A94345F17A5}" type="CELLRANGE">
-                      <a:rPr lang="en-CH"/>
+                    <a:fld id="{DDF1D3A3-C799-4EEF-9D66-218BA73EAF04}" type="CELLRANGE">
+                      <a:rPr lang="en-US"/>
                       <a:pPr/>
                       <a:t>[CELLRANGE]</a:t>
                     </a:fld>
@@ -478,7 +390,41 @@
                   <c15:showDataLabelsRange val="1"/>
                 </c:ext>
                 <c:ext xmlns:c16="http://schemas.microsoft.com/office/drawing/2014/chart" uri="{C3380CC4-5D6E-409C-BE32-E72D297353CC}">
-                  <c16:uniqueId val="{00000006-56E2-4932-8EC3-ADD650911F4A}"/>
+                  <c16:uniqueId val="{0000000D-1938-485B-B875-578B183FAEA8}"/>
+                </c:ext>
+              </c:extLst>
+            </c:dLbl>
+            <c:dLbl>
+              <c:idx val="6"/>
+              <c:tx>
+                <c:rich>
+                  <a:bodyPr/>
+                  <a:lstStyle/>
+                  <a:p>
+                    <a:fld id="{5279FE45-6B99-440A-96BC-41F24D025C55}" type="CELLRANGE">
+                      <a:rPr lang="en-US"/>
+                      <a:pPr/>
+                      <a:t>[CELLRANGE]</a:t>
+                    </a:fld>
+                    <a:endParaRPr lang="en-CH"/>
+                  </a:p>
+                </c:rich>
+              </c:tx>
+              <c:dLblPos val="ctr"/>
+              <c:showLegendKey val="0"/>
+              <c:showVal val="0"/>
+              <c:showCatName val="0"/>
+              <c:showSerName val="0"/>
+              <c:showPercent val="0"/>
+              <c:showBubbleSize val="0"/>
+              <c:extLst>
+                <c:ext xmlns:c15="http://schemas.microsoft.com/office/drawing/2012/chart" uri="{CE6537A1-D6FC-4f65-9D91-7224C49458BB}">
+                  <c15:dlblFieldTable/>
+                  <c15:xForSave val="1"/>
+                  <c15:showDataLabelsRange val="1"/>
+                </c:ext>
+                <c:ext xmlns:c16="http://schemas.microsoft.com/office/drawing/2014/chart" uri="{C3380CC4-5D6E-409C-BE32-E72D297353CC}">
+                  <c16:uniqueId val="{0000000E-1938-485B-B875-578B183FAEA8}"/>
                 </c:ext>
               </c:extLst>
             </c:dLbl>
@@ -486,8 +432,8 @@
               <c:idx val="7"/>
               <c:layout>
                 <c:manualLayout>
-                  <c:x val="-7.1256597222222218E-2"/>
-                  <c:y val="-2.4253472222222263E-2"/>
+                  <c:x val="-0.10353923611111111"/>
+                  <c:y val="2.204861111111111E-3"/>
                 </c:manualLayout>
               </c:layout>
               <c:tx>
@@ -495,8 +441,8 @@
                   <a:bodyPr/>
                   <a:lstStyle/>
                   <a:p>
-                    <a:fld id="{8D01536A-6C9A-411B-8CC9-EFAB0B95D570}" type="CELLRANGE">
-                      <a:rPr lang="en-US"/>
+                    <a:fld id="{3409778F-5346-49D9-B737-24A913ABE3FA}" type="CELLRANGE">
+                      <a:rPr lang="en-US" dirty="0"/>
                       <a:pPr/>
                       <a:t>[CELLRANGE]</a:t>
                     </a:fld>
@@ -517,7 +463,41 @@
                   <c15:showDataLabelsRange val="1"/>
                 </c:ext>
                 <c:ext xmlns:c16="http://schemas.microsoft.com/office/drawing/2014/chart" uri="{C3380CC4-5D6E-409C-BE32-E72D297353CC}">
-                  <c16:uniqueId val="{00000001-BFDE-435D-9795-1DC3C0B2782B}"/>
+                  <c16:uniqueId val="{0000000F-1938-485B-B875-578B183FAEA8}"/>
+                </c:ext>
+              </c:extLst>
+            </c:dLbl>
+            <c:dLbl>
+              <c:idx val="8"/>
+              <c:tx>
+                <c:rich>
+                  <a:bodyPr/>
+                  <a:lstStyle/>
+                  <a:p>
+                    <a:fld id="{9B1E955A-BD17-44C5-A9F0-CCB530CF2D19}" type="CELLRANGE">
+                      <a:rPr lang="en-US"/>
+                      <a:pPr/>
+                      <a:t>[CELLRANGE]</a:t>
+                    </a:fld>
+                    <a:endParaRPr lang="en-CH"/>
+                  </a:p>
+                </c:rich>
+              </c:tx>
+              <c:dLblPos val="ctr"/>
+              <c:showLegendKey val="0"/>
+              <c:showVal val="0"/>
+              <c:showCatName val="0"/>
+              <c:showSerName val="0"/>
+              <c:showPercent val="0"/>
+              <c:showBubbleSize val="0"/>
+              <c:extLst>
+                <c:ext xmlns:c15="http://schemas.microsoft.com/office/drawing/2012/chart" uri="{CE6537A1-D6FC-4f65-9D91-7224C49458BB}">
+                  <c15:dlblFieldTable/>
+                  <c15:xForSave val="1"/>
+                  <c15:showDataLabelsRange val="1"/>
+                </c:ext>
+                <c:ext xmlns:c16="http://schemas.microsoft.com/office/drawing/2014/chart" uri="{C3380CC4-5D6E-409C-BE32-E72D297353CC}">
+                  <c16:uniqueId val="{00000010-1938-485B-B875-578B183FAEA8}"/>
                 </c:ext>
               </c:extLst>
             </c:dLbl>
@@ -533,7 +513,7 @@
               <a:lstStyle/>
               <a:p>
                 <a:pPr>
-                  <a:defRPr sz="900" b="1" i="0" u="none" strike="noStrike" kern="1200" baseline="0">
+                  <a:defRPr sz="1100" b="1" i="0" u="none" strike="noStrike" kern="1200" baseline="0">
                     <a:solidFill>
                       <a:schemeClr val="tx1"/>
                     </a:solidFill>
@@ -576,27 +556,27 @@
           </c:dLbls>
           <c:xVal>
             <c:numRef>
-              <c:f>Sheet1!$C$4:$C$11</c:f>
+              <c:f>Sheet1!$B$2:$B$10</c:f>
               <c:numCache>
                 <c:formatCode>0%</c:formatCode>
-                <c:ptCount val="8"/>
+                <c:ptCount val="9"/>
                 <c:pt idx="0">
                   <c:v>0</c:v>
                 </c:pt>
                 <c:pt idx="1">
-                  <c:v>0.5</c:v>
+                  <c:v>0</c:v>
                 </c:pt>
                 <c:pt idx="2">
                   <c:v>0.4</c:v>
                 </c:pt>
                 <c:pt idx="3">
-                  <c:v>0.6</c:v>
+                  <c:v>0.2</c:v>
                 </c:pt>
                 <c:pt idx="4">
-                  <c:v>0.4</c:v>
+                  <c:v>0.1</c:v>
                 </c:pt>
                 <c:pt idx="5">
-                  <c:v>0.8</c:v>
+                  <c:v>0.3</c:v>
                 </c:pt>
                 <c:pt idx="6">
                   <c:v>0.1</c:v>
@@ -604,26 +584,29 @@
                 <c:pt idx="7">
                   <c:v>0.05</c:v>
                 </c:pt>
+                <c:pt idx="8">
+                  <c:v>0.4</c:v>
+                </c:pt>
               </c:numCache>
             </c:numRef>
           </c:xVal>
           <c:yVal>
             <c:numRef>
-              <c:f>Sheet1!$D$4:$D$11</c:f>
+              <c:f>Sheet1!$C$2:$C$10</c:f>
               <c:numCache>
                 <c:formatCode>General</c:formatCode>
-                <c:ptCount val="8"/>
+                <c:ptCount val="9"/>
                 <c:pt idx="0">
                   <c:v>0</c:v>
                 </c:pt>
                 <c:pt idx="1">
-                  <c:v>5</c:v>
+                  <c:v>0</c:v>
                 </c:pt>
                 <c:pt idx="2">
                   <c:v>8</c:v>
                 </c:pt>
                 <c:pt idx="3">
-                  <c:v>7</c:v>
+                  <c:v>5</c:v>
                 </c:pt>
                 <c:pt idx="4">
                   <c:v>1</c:v>
@@ -635,40 +618,46 @@
                   <c:v>3</c:v>
                 </c:pt>
                 <c:pt idx="7">
-                  <c:v>8</c:v>
+                  <c:v>4</c:v>
+                </c:pt>
+                <c:pt idx="8">
+                  <c:v>2</c:v>
                 </c:pt>
               </c:numCache>
             </c:numRef>
           </c:yVal>
           <c:bubbleSize>
             <c:numRef>
-              <c:f>Sheet1!$E$4:$E$11</c:f>
+              <c:f>Sheet1!$D$2:$D$10</c:f>
               <c:numCache>
                 <c:formatCode>General</c:formatCode>
-                <c:ptCount val="8"/>
+                <c:ptCount val="9"/>
                 <c:pt idx="0">
                   <c:v>0</c:v>
                 </c:pt>
                 <c:pt idx="1">
-                  <c:v>2.5</c:v>
+                  <c:v>0</c:v>
                 </c:pt>
                 <c:pt idx="2">
                   <c:v>3.2</c:v>
                 </c:pt>
                 <c:pt idx="3">
-                  <c:v>4.2</c:v>
+                  <c:v>1</c:v>
                 </c:pt>
                 <c:pt idx="4">
-                  <c:v>0.4</c:v>
+                  <c:v>0.1</c:v>
                 </c:pt>
                 <c:pt idx="5">
-                  <c:v>6.4</c:v>
+                  <c:v>2.4</c:v>
                 </c:pt>
                 <c:pt idx="6">
                   <c:v>0.30000000000000004</c:v>
                 </c:pt>
                 <c:pt idx="7">
-                  <c:v>0.4</c:v>
+                  <c:v>0.2</c:v>
+                </c:pt>
+                <c:pt idx="8">
+                  <c:v>0.8</c:v>
                 </c:pt>
               </c:numCache>
             </c:numRef>
@@ -677,9 +666,9 @@
           <c:extLst>
             <c:ext xmlns:c15="http://schemas.microsoft.com/office/drawing/2012/chart" uri="{02D57815-91ED-43cb-92C2-25804820EDAC}">
               <c15:datalabelsRange>
-                <c15:f>Sheet1!$B$4:$B$11</c15:f>
+                <c15:f>Sheet1!$A$2:$A$10</c15:f>
                 <c15:dlblRangeCache>
-                  <c:ptCount val="8"/>
+                  <c:ptCount val="9"/>
                   <c:pt idx="0">
                     <c:v>Kubernetes Cluster</c:v>
                   </c:pt>
@@ -704,11 +693,14 @@
                   <c:pt idx="7">
                     <c:v>Web App Monitors Own Cluster</c:v>
                   </c:pt>
+                  <c:pt idx="8">
+                    <c:v>Amazon Simple Notification Service API</c:v>
+                  </c:pt>
                 </c15:dlblRangeCache>
               </c15:datalabelsRange>
             </c:ext>
             <c:ext xmlns:c16="http://schemas.microsoft.com/office/drawing/2014/chart" uri="{C3380CC4-5D6E-409C-BE32-E72D297353CC}">
-              <c16:uniqueId val="{00000007-56E2-4932-8EC3-ADD650911F4A}"/>
+              <c16:uniqueId val="{00000007-1938-485B-B875-578B183FAEA8}"/>
             </c:ext>
           </c:extLst>
         </c:ser>
@@ -755,7 +747,7 @@
               <a:lstStyle/>
               <a:p>
                 <a:pPr>
-                  <a:defRPr sz="1000" b="1" i="0" u="none" strike="noStrike" kern="1200" baseline="0">
+                  <a:defRPr sz="1100" b="0" i="0" u="none" strike="noStrike" kern="1200" baseline="0">
                     <a:solidFill>
                       <a:schemeClr val="tx1"/>
                     </a:solidFill>
@@ -765,7 +757,7 @@
                   </a:defRPr>
                 </a:pPr>
                 <a:r>
-                  <a:rPr lang="de-CH" b="1"/>
+                  <a:rPr lang="en-GB" b="1" noProof="0" dirty="0"/>
                   <a:t>Probability of Occurrence</a:t>
                 </a:r>
               </a:p>
@@ -784,7 +776,7 @@
             <a:lstStyle/>
             <a:p>
               <a:pPr>
-                <a:defRPr sz="1000" b="1" i="0" u="none" strike="noStrike" kern="1200" baseline="0">
+                <a:defRPr sz="1100" b="0" i="0" u="none" strike="noStrike" kern="1200" baseline="0">
                   <a:solidFill>
                     <a:schemeClr val="tx1"/>
                   </a:solidFill>
@@ -819,7 +811,7 @@
           <a:lstStyle/>
           <a:p>
             <a:pPr>
-              <a:defRPr sz="900" b="0" i="0" u="none" strike="noStrike" kern="1200" baseline="0">
+              <a:defRPr sz="1100" b="0" i="0" u="none" strike="noStrike" kern="1200" baseline="0">
                 <a:solidFill>
                   <a:schemeClr val="tx1"/>
                 </a:solidFill>
@@ -866,7 +858,7 @@
               <a:lstStyle/>
               <a:p>
                 <a:pPr>
-                  <a:defRPr sz="1000" b="1" i="0" u="none" strike="noStrike" kern="1200" baseline="0">
+                  <a:defRPr sz="1100" b="0" i="0" u="none" strike="noStrike" kern="1200" baseline="0">
                     <a:solidFill>
                       <a:schemeClr val="tx1"/>
                     </a:solidFill>
@@ -876,7 +868,7 @@
                   </a:defRPr>
                 </a:pPr>
                 <a:r>
-                  <a:rPr lang="de-CH" b="1"/>
+                  <a:rPr lang="en-GB" b="1" noProof="0" dirty="0"/>
                   <a:t>Severity of Damage</a:t>
                 </a:r>
               </a:p>
@@ -895,7 +887,7 @@
             <a:lstStyle/>
             <a:p>
               <a:pPr>
-                <a:defRPr sz="1000" b="1" i="0" u="none" strike="noStrike" kern="1200" baseline="0">
+                <a:defRPr sz="1100" b="0" i="0" u="none" strike="noStrike" kern="1200" baseline="0">
                   <a:solidFill>
                     <a:schemeClr val="tx1"/>
                   </a:solidFill>
@@ -930,7 +922,7 @@
           <a:lstStyle/>
           <a:p>
             <a:pPr>
-              <a:defRPr sz="900" b="0" i="0" u="none" strike="noStrike" kern="1200" baseline="0">
+              <a:defRPr sz="1100" b="0" i="0" u="none" strike="noStrike" kern="1200" baseline="0">
                 <a:solidFill>
                   <a:schemeClr val="tx1"/>
                 </a:solidFill>
@@ -976,14 +968,8 @@
     </c:plotArea>
     <c:plotVisOnly val="1"/>
     <c:dispBlanksAs val="gap"/>
-    <c:extLst>
-      <c:ext xmlns:c16r3="http://schemas.microsoft.com/office/drawing/2017/03/chart" uri="{56B9EC1D-385E-4148-901F-78D8002777C0}">
-        <c16r3:dataDisplayOptions16>
-          <c16r3:dispNaAsBlank val="1"/>
-        </c16r3:dataDisplayOptions16>
-      </c:ext>
-    </c:extLst>
     <c:showDLblsOverMax val="0"/>
+    <c:extLst/>
   </c:chart>
   <c:spPr>
     <a:solidFill>
@@ -999,7 +985,7 @@
     <a:lstStyle/>
     <a:p>
       <a:pPr>
-        <a:defRPr>
+        <a:defRPr sz="1100">
           <a:solidFill>
             <a:schemeClr val="tx1"/>
           </a:solidFill>
@@ -1010,7 +996,7 @@
       <a:endParaRPr lang="en-CH"/>
     </a:p>
   </c:txPr>
-  <c:externalData r:id="rId3">
+  <c:externalData r:id="rId4">
     <c:autoUpdate val="0"/>
   </c:externalData>
 </c:chartSpace>
@@ -1740,7 +1726,7 @@
           <a:p>
             <a:fld id="{33BA2EDE-66EC-4101-A9CB-9DAA9A1E1BB8}" type="datetimeFigureOut">
               <a:rPr lang="en-CH" smtClean="0"/>
-              <a:t>14/03/2022</a:t>
+              <a:t>01/04/2022</a:t>
             </a:fld>
             <a:endParaRPr lang="en-CH"/>
           </a:p>
@@ -1940,7 +1926,7 @@
           <a:p>
             <a:fld id="{33BA2EDE-66EC-4101-A9CB-9DAA9A1E1BB8}" type="datetimeFigureOut">
               <a:rPr lang="en-CH" smtClean="0"/>
-              <a:t>14/03/2022</a:t>
+              <a:t>01/04/2022</a:t>
             </a:fld>
             <a:endParaRPr lang="en-CH"/>
           </a:p>
@@ -2150,7 +2136,7 @@
           <a:p>
             <a:fld id="{33BA2EDE-66EC-4101-A9CB-9DAA9A1E1BB8}" type="datetimeFigureOut">
               <a:rPr lang="en-CH" smtClean="0"/>
-              <a:t>14/03/2022</a:t>
+              <a:t>01/04/2022</a:t>
             </a:fld>
             <a:endParaRPr lang="en-CH"/>
           </a:p>
@@ -2350,7 +2336,7 @@
           <a:p>
             <a:fld id="{33BA2EDE-66EC-4101-A9CB-9DAA9A1E1BB8}" type="datetimeFigureOut">
               <a:rPr lang="en-CH" smtClean="0"/>
-              <a:t>14/03/2022</a:t>
+              <a:t>01/04/2022</a:t>
             </a:fld>
             <a:endParaRPr lang="en-CH"/>
           </a:p>
@@ -2626,7 +2612,7 @@
           <a:p>
             <a:fld id="{33BA2EDE-66EC-4101-A9CB-9DAA9A1E1BB8}" type="datetimeFigureOut">
               <a:rPr lang="en-CH" smtClean="0"/>
-              <a:t>14/03/2022</a:t>
+              <a:t>01/04/2022</a:t>
             </a:fld>
             <a:endParaRPr lang="en-CH"/>
           </a:p>
@@ -2894,7 +2880,7 @@
           <a:p>
             <a:fld id="{33BA2EDE-66EC-4101-A9CB-9DAA9A1E1BB8}" type="datetimeFigureOut">
               <a:rPr lang="en-CH" smtClean="0"/>
-              <a:t>14/03/2022</a:t>
+              <a:t>01/04/2022</a:t>
             </a:fld>
             <a:endParaRPr lang="en-CH"/>
           </a:p>
@@ -3309,7 +3295,7 @@
           <a:p>
             <a:fld id="{33BA2EDE-66EC-4101-A9CB-9DAA9A1E1BB8}" type="datetimeFigureOut">
               <a:rPr lang="en-CH" smtClean="0"/>
-              <a:t>14/03/2022</a:t>
+              <a:t>01/04/2022</a:t>
             </a:fld>
             <a:endParaRPr lang="en-CH"/>
           </a:p>
@@ -3451,7 +3437,7 @@
           <a:p>
             <a:fld id="{33BA2EDE-66EC-4101-A9CB-9DAA9A1E1BB8}" type="datetimeFigureOut">
               <a:rPr lang="en-CH" smtClean="0"/>
-              <a:t>14/03/2022</a:t>
+              <a:t>01/04/2022</a:t>
             </a:fld>
             <a:endParaRPr lang="en-CH"/>
           </a:p>
@@ -3564,7 +3550,7 @@
           <a:p>
             <a:fld id="{33BA2EDE-66EC-4101-A9CB-9DAA9A1E1BB8}" type="datetimeFigureOut">
               <a:rPr lang="en-CH" smtClean="0"/>
-              <a:t>14/03/2022</a:t>
+              <a:t>01/04/2022</a:t>
             </a:fld>
             <a:endParaRPr lang="en-CH"/>
           </a:p>
@@ -3877,7 +3863,7 @@
           <a:p>
             <a:fld id="{33BA2EDE-66EC-4101-A9CB-9DAA9A1E1BB8}" type="datetimeFigureOut">
               <a:rPr lang="en-CH" smtClean="0"/>
-              <a:t>14/03/2022</a:t>
+              <a:t>01/04/2022</a:t>
             </a:fld>
             <a:endParaRPr lang="en-CH"/>
           </a:p>
@@ -4166,7 +4152,7 @@
           <a:p>
             <a:fld id="{33BA2EDE-66EC-4101-A9CB-9DAA9A1E1BB8}" type="datetimeFigureOut">
               <a:rPr lang="en-CH" smtClean="0"/>
-              <a:t>14/03/2022</a:t>
+              <a:t>01/04/2022</a:t>
             </a:fld>
             <a:endParaRPr lang="en-CH"/>
           </a:p>
@@ -4409,7 +4395,7 @@
           <a:p>
             <a:fld id="{33BA2EDE-66EC-4101-A9CB-9DAA9A1E1BB8}" type="datetimeFigureOut">
               <a:rPr lang="en-CH" smtClean="0"/>
-              <a:t>14/03/2022</a:t>
+              <a:t>01/04/2022</a:t>
             </a:fld>
             <a:endParaRPr lang="en-CH"/>
           </a:p>
@@ -4828,26 +4814,24 @@
       </p:grpSpPr>
       <p:graphicFrame>
         <p:nvGraphicFramePr>
-          <p:cNvPr id="4" name="Chart 3">
-            <a:extLst>
-              <a:ext uri="{FF2B5EF4-FFF2-40B4-BE49-F238E27FC236}">
-                <a16:creationId xmlns:a16="http://schemas.microsoft.com/office/drawing/2014/main" id="{181ECE1A-370F-4702-949E-99BA656B6B96}"/>
-              </a:ext>
-            </a:extLst>
-          </p:cNvPr>
-          <p:cNvGraphicFramePr>
-            <a:graphicFrameLocks/>
-          </p:cNvGraphicFramePr>
+          <p:cNvPr id="9" name="Chart 8">
+            <a:extLst>
+              <a:ext uri="{FF2B5EF4-FFF2-40B4-BE49-F238E27FC236}">
+                <a16:creationId xmlns:a16="http://schemas.microsoft.com/office/drawing/2014/main" id="{04F649A5-AB4D-43F3-B231-DB0DC3314238}"/>
+              </a:ext>
+            </a:extLst>
+          </p:cNvPr>
+          <p:cNvGraphicFramePr/>
           <p:nvPr>
             <p:extLst>
               <p:ext uri="{D42A27DB-BD31-4B8C-83A1-F6EECF244321}">
-                <p14:modId xmlns:p14="http://schemas.microsoft.com/office/powerpoint/2010/main" val="423944992"/>
+                <p14:modId xmlns:p14="http://schemas.microsoft.com/office/powerpoint/2010/main" val="3074247986"/>
               </p:ext>
             </p:extLst>
           </p:nvPr>
         </p:nvGraphicFramePr>
         <p:xfrm>
-          <a:off x="699795" y="317240"/>
+          <a:off x="62006" y="396935"/>
           <a:ext cx="5760000" cy="5760000"/>
         </p:xfrm>
         <a:graphic>
@@ -4856,10 +4840,226 @@
           </a:graphicData>
         </a:graphic>
       </p:graphicFrame>
+      <p:sp>
+        <p:nvSpPr>
+          <p:cNvPr id="10" name="TextBox 9">
+            <a:extLst>
+              <a:ext uri="{FF2B5EF4-FFF2-40B4-BE49-F238E27FC236}">
+                <a16:creationId xmlns:a16="http://schemas.microsoft.com/office/drawing/2014/main" id="{7ED8EAAB-12CD-4BAA-A142-DED906CE774B}"/>
+              </a:ext>
+            </a:extLst>
+          </p:cNvPr>
+          <p:cNvSpPr txBox="1"/>
+          <p:nvPr/>
+        </p:nvSpPr>
+        <p:spPr>
+          <a:xfrm>
+            <a:off x="6535271" y="645459"/>
+            <a:ext cx="4188758" cy="3816429"/>
+          </a:xfrm>
+          <a:prstGeom prst="rect">
+            <a:avLst/>
+          </a:prstGeom>
+          <a:noFill/>
+        </p:spPr>
+        <p:txBody>
+          <a:bodyPr wrap="square" rtlCol="0">
+            <a:spAutoFit/>
+          </a:bodyPr>
+          <a:lstStyle/>
+          <a:p>
+            <a:r>
+              <a:rPr lang="en-GB" sz="1100" b="1" dirty="0">
+                <a:latin typeface="Arial" panose="020B0604020202020204" pitchFamily="34" charset="0"/>
+                <a:cs typeface="Arial" panose="020B0604020202020204" pitchFamily="34" charset="0"/>
+              </a:rPr>
+              <a:t>How to update this chart</a:t>
+            </a:r>
+          </a:p>
+          <a:p>
+            <a:endParaRPr lang="en-GB" sz="1100" i="1" dirty="0">
+              <a:latin typeface="Arial" panose="020B0604020202020204" pitchFamily="34" charset="0"/>
+              <a:cs typeface="Arial" panose="020B0604020202020204" pitchFamily="34" charset="0"/>
+            </a:endParaRPr>
+          </a:p>
+          <a:p>
+            <a:r>
+              <a:rPr lang="en-GB" sz="1100" i="1" dirty="0">
+                <a:latin typeface="Arial" panose="020B0604020202020204" pitchFamily="34" charset="0"/>
+                <a:cs typeface="Arial" panose="020B0604020202020204" pitchFamily="34" charset="0"/>
+              </a:rPr>
+              <a:t>Add/update/remove risk</a:t>
+            </a:r>
+          </a:p>
+          <a:p>
+            <a:pPr marL="228600" indent="-228600">
+              <a:buFont typeface="+mj-lt"/>
+              <a:buAutoNum type="arabicPeriod"/>
+            </a:pPr>
+            <a:r>
+              <a:rPr lang="en-GB" sz="1100" dirty="0">
+                <a:latin typeface="Arial" panose="020B0604020202020204" pitchFamily="34" charset="0"/>
+                <a:cs typeface="Arial" panose="020B0604020202020204" pitchFamily="34" charset="0"/>
+              </a:rPr>
+              <a:t>Right-click on chart -&gt; Edit Data</a:t>
+            </a:r>
+          </a:p>
+          <a:p>
+            <a:pPr marL="228600" indent="-228600">
+              <a:buFont typeface="+mj-lt"/>
+              <a:buAutoNum type="arabicPeriod"/>
+            </a:pPr>
+            <a:r>
+              <a:rPr lang="en-GB" sz="1100" dirty="0">
+                <a:latin typeface="Arial" panose="020B0604020202020204" pitchFamily="34" charset="0"/>
+                <a:cs typeface="Arial" panose="020B0604020202020204" pitchFamily="34" charset="0"/>
+              </a:rPr>
+              <a:t>Add a new risk below the existing ones -&gt; the highlighted area of the selected data should expand automatically</a:t>
+            </a:r>
+          </a:p>
+          <a:p>
+            <a:pPr marL="228600" indent="-228600">
+              <a:buFont typeface="+mj-lt"/>
+              <a:buAutoNum type="arabicPeriod"/>
+            </a:pPr>
+            <a:r>
+              <a:rPr lang="en-GB" sz="1100" dirty="0">
+                <a:latin typeface="Arial" panose="020B0604020202020204" pitchFamily="34" charset="0"/>
+                <a:cs typeface="Arial" panose="020B0604020202020204" pitchFamily="34" charset="0"/>
+              </a:rPr>
+              <a:t>Only add data to the first two columns, the third is calculated automatically</a:t>
+            </a:r>
+          </a:p>
+          <a:p>
+            <a:pPr marL="228600" indent="-228600">
+              <a:buFont typeface="+mj-lt"/>
+              <a:buAutoNum type="arabicPeriod"/>
+            </a:pPr>
+            <a:r>
+              <a:rPr lang="en-GB" sz="1100" dirty="0">
+                <a:latin typeface="Arial" panose="020B0604020202020204" pitchFamily="34" charset="0"/>
+                <a:cs typeface="Arial" panose="020B0604020202020204" pitchFamily="34" charset="0"/>
+              </a:rPr>
+              <a:t>Once all data is entered a new bubble should appear automatically</a:t>
+            </a:r>
+          </a:p>
+          <a:p>
+            <a:pPr marL="228600" indent="-228600">
+              <a:buFont typeface="+mj-lt"/>
+              <a:buAutoNum type="arabicPeriod"/>
+            </a:pPr>
+            <a:r>
+              <a:rPr lang="en-GB" sz="1100" dirty="0">
+                <a:latin typeface="Arial" panose="020B0604020202020204" pitchFamily="34" charset="0"/>
+                <a:cs typeface="Arial" panose="020B0604020202020204" pitchFamily="34" charset="0"/>
+              </a:rPr>
+              <a:t>If a risk is fully mitigated, set the first two values to 0, this will eliminate the bubble</a:t>
+            </a:r>
+          </a:p>
+          <a:p>
+            <a:endParaRPr lang="en-GB" sz="1100" i="1" dirty="0">
+              <a:latin typeface="Arial" panose="020B0604020202020204" pitchFamily="34" charset="0"/>
+              <a:cs typeface="Arial" panose="020B0604020202020204" pitchFamily="34" charset="0"/>
+            </a:endParaRPr>
+          </a:p>
+          <a:p>
+            <a:r>
+              <a:rPr lang="en-GB" sz="1100" i="1" dirty="0">
+                <a:latin typeface="Arial" panose="020B0604020202020204" pitchFamily="34" charset="0"/>
+                <a:cs typeface="Arial" panose="020B0604020202020204" pitchFamily="34" charset="0"/>
+              </a:rPr>
+              <a:t>Save as PNG</a:t>
+            </a:r>
+          </a:p>
+          <a:p>
+            <a:pPr marL="228600" indent="-228600">
+              <a:buFont typeface="+mj-lt"/>
+              <a:buAutoNum type="arabicPeriod"/>
+            </a:pPr>
+            <a:r>
+              <a:rPr lang="en-GB" sz="1100" dirty="0">
+                <a:latin typeface="Arial" panose="020B0604020202020204" pitchFamily="34" charset="0"/>
+                <a:cs typeface="Arial" panose="020B0604020202020204" pitchFamily="34" charset="0"/>
+              </a:rPr>
+              <a:t>Right-click on the overall chart area, i.e. a long context-menu should appear (a good spot to right-click is the white area below the 80% x-axis label)</a:t>
+            </a:r>
+          </a:p>
+          <a:p>
+            <a:pPr marL="228600" indent="-228600">
+              <a:buFont typeface="+mj-lt"/>
+              <a:buAutoNum type="arabicPeriod"/>
+            </a:pPr>
+            <a:r>
+              <a:rPr lang="en-GB" sz="1100" dirty="0">
+                <a:latin typeface="Arial" panose="020B0604020202020204" pitchFamily="34" charset="0"/>
+                <a:cs typeface="Arial" panose="020B0604020202020204" pitchFamily="34" charset="0"/>
+              </a:rPr>
+              <a:t>Select: ‘Save As Picture…’</a:t>
+            </a:r>
+          </a:p>
+          <a:p>
+            <a:pPr marL="228600" indent="-228600">
+              <a:buFont typeface="+mj-lt"/>
+              <a:buAutoNum type="arabicPeriod"/>
+            </a:pPr>
+            <a:r>
+              <a:rPr lang="en-GB" sz="1100" dirty="0">
+                <a:latin typeface="Arial" panose="020B0604020202020204" pitchFamily="34" charset="0"/>
+                <a:cs typeface="Arial" panose="020B0604020202020204" pitchFamily="34" charset="0"/>
+              </a:rPr>
+              <a:t>Overwrite the existing risk_matrix.png file in the </a:t>
+            </a:r>
+            <a:r>
+              <a:rPr lang="en-GB" sz="1100" dirty="0" err="1">
+                <a:latin typeface="Arial" panose="020B0604020202020204" pitchFamily="34" charset="0"/>
+                <a:cs typeface="Arial" panose="020B0604020202020204" pitchFamily="34" charset="0"/>
+              </a:rPr>
+              <a:t>kubewatch</a:t>
+            </a:r>
+            <a:r>
+              <a:rPr lang="en-GB" sz="1100" dirty="0">
+                <a:latin typeface="Arial" panose="020B0604020202020204" pitchFamily="34" charset="0"/>
+                <a:cs typeface="Arial" panose="020B0604020202020204" pitchFamily="34" charset="0"/>
+              </a:rPr>
+              <a:t>\Documentation\</a:t>
+            </a:r>
+            <a:r>
+              <a:rPr lang="en-GB" sz="1100" dirty="0" err="1">
+                <a:latin typeface="Arial" panose="020B0604020202020204" pitchFamily="34" charset="0"/>
+                <a:cs typeface="Arial" panose="020B0604020202020204" pitchFamily="34" charset="0"/>
+              </a:rPr>
+              <a:t>src</a:t>
+            </a:r>
+            <a:r>
+              <a:rPr lang="en-GB" sz="1100" dirty="0">
+                <a:latin typeface="Arial" panose="020B0604020202020204" pitchFamily="34" charset="0"/>
+                <a:cs typeface="Arial" panose="020B0604020202020204" pitchFamily="34" charset="0"/>
+              </a:rPr>
+              <a:t>\resources folder</a:t>
+            </a:r>
+          </a:p>
+          <a:p>
+            <a:endParaRPr lang="en-GB" sz="1100" dirty="0">
+              <a:latin typeface="Arial" panose="020B0604020202020204" pitchFamily="34" charset="0"/>
+              <a:cs typeface="Arial" panose="020B0604020202020204" pitchFamily="34" charset="0"/>
+            </a:endParaRPr>
+          </a:p>
+          <a:p>
+            <a:pPr marL="228600" indent="-228600">
+              <a:buFont typeface="+mj-lt"/>
+              <a:buAutoNum type="arabicPeriod"/>
+            </a:pPr>
+            <a:endParaRPr lang="en-CH" sz="1100" dirty="0">
+              <a:latin typeface="Arial" panose="020B0604020202020204" pitchFamily="34" charset="0"/>
+              <a:cs typeface="Arial" panose="020B0604020202020204" pitchFamily="34" charset="0"/>
+            </a:endParaRPr>
+          </a:p>
+        </p:txBody>
+      </p:sp>
     </p:spTree>
     <p:extLst>
       <p:ext uri="{BB962C8B-B14F-4D97-AF65-F5344CB8AC3E}">
-        <p14:creationId xmlns:p14="http://schemas.microsoft.com/office/powerpoint/2010/main" val="3843010214"/>
+        <p14:creationId xmlns:p14="http://schemas.microsoft.com/office/powerpoint/2010/main" val="1353383277"/>
       </p:ext>
     </p:extLst>
   </p:cSld>
@@ -5162,4 +5362,290 @@
     </a:ext>
   </a:extLst>
 </a:theme>
+</file>
+
+<file path=ppt/theme/themeOverride1.xml><?xml version="1.0" encoding="utf-8"?>
+<a:themeOverride xmlns:a="http://schemas.openxmlformats.org/drawingml/2006/main">
+  <a:clrScheme name="Office">
+    <a:dk1>
+      <a:sysClr val="windowText" lastClr="000000"/>
+    </a:dk1>
+    <a:lt1>
+      <a:sysClr val="window" lastClr="FFFFFF"/>
+    </a:lt1>
+    <a:dk2>
+      <a:srgbClr val="44546A"/>
+    </a:dk2>
+    <a:lt2>
+      <a:srgbClr val="E7E6E6"/>
+    </a:lt2>
+    <a:accent1>
+      <a:srgbClr val="4472C4"/>
+    </a:accent1>
+    <a:accent2>
+      <a:srgbClr val="ED7D31"/>
+    </a:accent2>
+    <a:accent3>
+      <a:srgbClr val="A5A5A5"/>
+    </a:accent3>
+    <a:accent4>
+      <a:srgbClr val="FFC000"/>
+    </a:accent4>
+    <a:accent5>
+      <a:srgbClr val="5B9BD5"/>
+    </a:accent5>
+    <a:accent6>
+      <a:srgbClr val="70AD47"/>
+    </a:accent6>
+    <a:hlink>
+      <a:srgbClr val="0563C1"/>
+    </a:hlink>
+    <a:folHlink>
+      <a:srgbClr val="954F72"/>
+    </a:folHlink>
+  </a:clrScheme>
+  <a:fontScheme name="Office">
+    <a:majorFont>
+      <a:latin typeface="Calibri Light" panose="020F0302020204030204"/>
+      <a:ea typeface=""/>
+      <a:cs typeface=""/>
+      <a:font script="Jpan" typeface="游ゴシック Light"/>
+      <a:font script="Hang" typeface="맑은 고딕"/>
+      <a:font script="Hans" typeface="等线 Light"/>
+      <a:font script="Hant" typeface="新細明體"/>
+      <a:font script="Arab" typeface="Times New Roman"/>
+      <a:font script="Hebr" typeface="Times New Roman"/>
+      <a:font script="Thai" typeface="Angsana New"/>
+      <a:font script="Ethi" typeface="Nyala"/>
+      <a:font script="Beng" typeface="Vrinda"/>
+      <a:font script="Gujr" typeface="Shruti"/>
+      <a:font script="Khmr" typeface="MoolBoran"/>
+      <a:font script="Knda" typeface="Tunga"/>
+      <a:font script="Guru" typeface="Raavi"/>
+      <a:font script="Cans" typeface="Euphemia"/>
+      <a:font script="Cher" typeface="Plantagenet Cherokee"/>
+      <a:font script="Yiii" typeface="Microsoft Yi Baiti"/>
+      <a:font script="Tibt" typeface="Microsoft Himalaya"/>
+      <a:font script="Thaa" typeface="MV Boli"/>
+      <a:font script="Deva" typeface="Mangal"/>
+      <a:font script="Telu" typeface="Gautami"/>
+      <a:font script="Taml" typeface="Latha"/>
+      <a:font script="Syrc" typeface="Estrangelo Edessa"/>
+      <a:font script="Orya" typeface="Kalinga"/>
+      <a:font script="Mlym" typeface="Kartika"/>
+      <a:font script="Laoo" typeface="DokChampa"/>
+      <a:font script="Sinh" typeface="Iskoola Pota"/>
+      <a:font script="Mong" typeface="Mongolian Baiti"/>
+      <a:font script="Viet" typeface="Times New Roman"/>
+      <a:font script="Uigh" typeface="Microsoft Uighur"/>
+      <a:font script="Geor" typeface="Sylfaen"/>
+      <a:font script="Armn" typeface="Arial"/>
+      <a:font script="Bugi" typeface="Leelawadee UI"/>
+      <a:font script="Bopo" typeface="Microsoft JhengHei"/>
+      <a:font script="Java" typeface="Javanese Text"/>
+      <a:font script="Lisu" typeface="Segoe UI"/>
+      <a:font script="Mymr" typeface="Myanmar Text"/>
+      <a:font script="Nkoo" typeface="Ebrima"/>
+      <a:font script="Olck" typeface="Nirmala UI"/>
+      <a:font script="Osma" typeface="Ebrima"/>
+      <a:font script="Phag" typeface="Phagspa"/>
+      <a:font script="Syrn" typeface="Estrangelo Edessa"/>
+      <a:font script="Syrj" typeface="Estrangelo Edessa"/>
+      <a:font script="Syre" typeface="Estrangelo Edessa"/>
+      <a:font script="Sora" typeface="Nirmala UI"/>
+      <a:font script="Tale" typeface="Microsoft Tai Le"/>
+      <a:font script="Talu" typeface="Microsoft New Tai Lue"/>
+      <a:font script="Tfng" typeface="Ebrima"/>
+    </a:majorFont>
+    <a:minorFont>
+      <a:latin typeface="Calibri" panose="020F0502020204030204"/>
+      <a:ea typeface=""/>
+      <a:cs typeface=""/>
+      <a:font script="Jpan" typeface="游ゴシック"/>
+      <a:font script="Hang" typeface="맑은 고딕"/>
+      <a:font script="Hans" typeface="等线"/>
+      <a:font script="Hant" typeface="新細明體"/>
+      <a:font script="Arab" typeface="Arial"/>
+      <a:font script="Hebr" typeface="Arial"/>
+      <a:font script="Thai" typeface="Cordia New"/>
+      <a:font script="Ethi" typeface="Nyala"/>
+      <a:font script="Beng" typeface="Vrinda"/>
+      <a:font script="Gujr" typeface="Shruti"/>
+      <a:font script="Khmr" typeface="DaunPenh"/>
+      <a:font script="Knda" typeface="Tunga"/>
+      <a:font script="Guru" typeface="Raavi"/>
+      <a:font script="Cans" typeface="Euphemia"/>
+      <a:font script="Cher" typeface="Plantagenet Cherokee"/>
+      <a:font script="Yiii" typeface="Microsoft Yi Baiti"/>
+      <a:font script="Tibt" typeface="Microsoft Himalaya"/>
+      <a:font script="Thaa" typeface="MV Boli"/>
+      <a:font script="Deva" typeface="Mangal"/>
+      <a:font script="Telu" typeface="Gautami"/>
+      <a:font script="Taml" typeface="Latha"/>
+      <a:font script="Syrc" typeface="Estrangelo Edessa"/>
+      <a:font script="Orya" typeface="Kalinga"/>
+      <a:font script="Mlym" typeface="Kartika"/>
+      <a:font script="Laoo" typeface="DokChampa"/>
+      <a:font script="Sinh" typeface="Iskoola Pota"/>
+      <a:font script="Mong" typeface="Mongolian Baiti"/>
+      <a:font script="Viet" typeface="Arial"/>
+      <a:font script="Uigh" typeface="Microsoft Uighur"/>
+      <a:font script="Geor" typeface="Sylfaen"/>
+      <a:font script="Armn" typeface="Arial"/>
+      <a:font script="Bugi" typeface="Leelawadee UI"/>
+      <a:font script="Bopo" typeface="Microsoft JhengHei"/>
+      <a:font script="Java" typeface="Javanese Text"/>
+      <a:font script="Lisu" typeface="Segoe UI"/>
+      <a:font script="Mymr" typeface="Myanmar Text"/>
+      <a:font script="Nkoo" typeface="Ebrima"/>
+      <a:font script="Olck" typeface="Nirmala UI"/>
+      <a:font script="Osma" typeface="Ebrima"/>
+      <a:font script="Phag" typeface="Phagspa"/>
+      <a:font script="Syrn" typeface="Estrangelo Edessa"/>
+      <a:font script="Syrj" typeface="Estrangelo Edessa"/>
+      <a:font script="Syre" typeface="Estrangelo Edessa"/>
+      <a:font script="Sora" typeface="Nirmala UI"/>
+      <a:font script="Tale" typeface="Microsoft Tai Le"/>
+      <a:font script="Talu" typeface="Microsoft New Tai Lue"/>
+      <a:font script="Tfng" typeface="Ebrima"/>
+    </a:minorFont>
+  </a:fontScheme>
+  <a:fmtScheme name="Office">
+    <a:fillStyleLst>
+      <a:solidFill>
+        <a:schemeClr val="phClr"/>
+      </a:solidFill>
+      <a:gradFill rotWithShape="1">
+        <a:gsLst>
+          <a:gs pos="0">
+            <a:schemeClr val="phClr">
+              <a:lumMod val="110000"/>
+              <a:satMod val="105000"/>
+              <a:tint val="67000"/>
+            </a:schemeClr>
+          </a:gs>
+          <a:gs pos="50000">
+            <a:schemeClr val="phClr">
+              <a:lumMod val="105000"/>
+              <a:satMod val="103000"/>
+              <a:tint val="73000"/>
+            </a:schemeClr>
+          </a:gs>
+          <a:gs pos="100000">
+            <a:schemeClr val="phClr">
+              <a:lumMod val="105000"/>
+              <a:satMod val="109000"/>
+              <a:tint val="81000"/>
+            </a:schemeClr>
+          </a:gs>
+        </a:gsLst>
+        <a:lin ang="5400000" scaled="0"/>
+      </a:gradFill>
+      <a:gradFill rotWithShape="1">
+        <a:gsLst>
+          <a:gs pos="0">
+            <a:schemeClr val="phClr">
+              <a:satMod val="103000"/>
+              <a:lumMod val="102000"/>
+              <a:tint val="94000"/>
+            </a:schemeClr>
+          </a:gs>
+          <a:gs pos="50000">
+            <a:schemeClr val="phClr">
+              <a:satMod val="110000"/>
+              <a:lumMod val="100000"/>
+              <a:shade val="100000"/>
+            </a:schemeClr>
+          </a:gs>
+          <a:gs pos="100000">
+            <a:schemeClr val="phClr">
+              <a:lumMod val="99000"/>
+              <a:satMod val="120000"/>
+              <a:shade val="78000"/>
+            </a:schemeClr>
+          </a:gs>
+        </a:gsLst>
+        <a:lin ang="5400000" scaled="0"/>
+      </a:gradFill>
+    </a:fillStyleLst>
+    <a:lnStyleLst>
+      <a:ln w="6350" cap="flat" cmpd="sng" algn="ctr">
+        <a:solidFill>
+          <a:schemeClr val="phClr"/>
+        </a:solidFill>
+        <a:prstDash val="solid"/>
+        <a:miter lim="800000"/>
+      </a:ln>
+      <a:ln w="12700" cap="flat" cmpd="sng" algn="ctr">
+        <a:solidFill>
+          <a:schemeClr val="phClr"/>
+        </a:solidFill>
+        <a:prstDash val="solid"/>
+        <a:miter lim="800000"/>
+      </a:ln>
+      <a:ln w="19050" cap="flat" cmpd="sng" algn="ctr">
+        <a:solidFill>
+          <a:schemeClr val="phClr"/>
+        </a:solidFill>
+        <a:prstDash val="solid"/>
+        <a:miter lim="800000"/>
+      </a:ln>
+    </a:lnStyleLst>
+    <a:effectStyleLst>
+      <a:effectStyle>
+        <a:effectLst/>
+      </a:effectStyle>
+      <a:effectStyle>
+        <a:effectLst/>
+      </a:effectStyle>
+      <a:effectStyle>
+        <a:effectLst>
+          <a:outerShdw blurRad="57150" dist="19050" dir="5400000" algn="ctr" rotWithShape="0">
+            <a:srgbClr val="000000">
+              <a:alpha val="63000"/>
+            </a:srgbClr>
+          </a:outerShdw>
+        </a:effectLst>
+      </a:effectStyle>
+    </a:effectStyleLst>
+    <a:bgFillStyleLst>
+      <a:solidFill>
+        <a:schemeClr val="phClr"/>
+      </a:solidFill>
+      <a:solidFill>
+        <a:schemeClr val="phClr">
+          <a:tint val="95000"/>
+          <a:satMod val="170000"/>
+        </a:schemeClr>
+      </a:solidFill>
+      <a:gradFill rotWithShape="1">
+        <a:gsLst>
+          <a:gs pos="0">
+            <a:schemeClr val="phClr">
+              <a:tint val="93000"/>
+              <a:satMod val="150000"/>
+              <a:shade val="98000"/>
+              <a:lumMod val="102000"/>
+            </a:schemeClr>
+          </a:gs>
+          <a:gs pos="50000">
+            <a:schemeClr val="phClr">
+              <a:tint val="98000"/>
+              <a:satMod val="130000"/>
+              <a:shade val="90000"/>
+              <a:lumMod val="103000"/>
+            </a:schemeClr>
+          </a:gs>
+          <a:gs pos="100000">
+            <a:schemeClr val="phClr">
+              <a:shade val="63000"/>
+              <a:satMod val="120000"/>
+            </a:schemeClr>
+          </a:gs>
+        </a:gsLst>
+        <a:lin ang="5400000" scaled="0"/>
+      </a:gradFill>
+    </a:bgFillStyleLst>
+  </a:fmtScheme>
+</a:themeOverride>
 </file>
</xml_diff>